<commit_message>
Remove unused images, Modify annotation images with -
</commit_message>
<xml_diff>
--- a/docs/img/orf_annotation.pptx
+++ b/docs/img/orf_annotation.pptx
@@ -266,7 +266,7 @@
           <a:p>
             <a:fld id="{E03E6CC4-A53F-6C4A-843B-012C7F076F51}" type="datetimeFigureOut">
               <a:rPr lang="fr-FR" smtClean="0"/>
-              <a:t>12/12/2020</a:t>
+              <a:t>14/12/2020</a:t>
             </a:fld>
             <a:endParaRPr lang="fr-FR"/>
           </a:p>
@@ -464,7 +464,7 @@
           <a:p>
             <a:fld id="{E03E6CC4-A53F-6C4A-843B-012C7F076F51}" type="datetimeFigureOut">
               <a:rPr lang="fr-FR" smtClean="0"/>
-              <a:t>12/12/2020</a:t>
+              <a:t>14/12/2020</a:t>
             </a:fld>
             <a:endParaRPr lang="fr-FR"/>
           </a:p>
@@ -672,7 +672,7 @@
           <a:p>
             <a:fld id="{E03E6CC4-A53F-6C4A-843B-012C7F076F51}" type="datetimeFigureOut">
               <a:rPr lang="fr-FR" smtClean="0"/>
-              <a:t>12/12/2020</a:t>
+              <a:t>14/12/2020</a:t>
             </a:fld>
             <a:endParaRPr lang="fr-FR"/>
           </a:p>
@@ -870,7 +870,7 @@
           <a:p>
             <a:fld id="{E03E6CC4-A53F-6C4A-843B-012C7F076F51}" type="datetimeFigureOut">
               <a:rPr lang="fr-FR" smtClean="0"/>
-              <a:t>12/12/2020</a:t>
+              <a:t>14/12/2020</a:t>
             </a:fld>
             <a:endParaRPr lang="fr-FR"/>
           </a:p>
@@ -1145,7 +1145,7 @@
           <a:p>
             <a:fld id="{E03E6CC4-A53F-6C4A-843B-012C7F076F51}" type="datetimeFigureOut">
               <a:rPr lang="fr-FR" smtClean="0"/>
-              <a:t>12/12/2020</a:t>
+              <a:t>14/12/2020</a:t>
             </a:fld>
             <a:endParaRPr lang="fr-FR"/>
           </a:p>
@@ -1410,7 +1410,7 @@
           <a:p>
             <a:fld id="{E03E6CC4-A53F-6C4A-843B-012C7F076F51}" type="datetimeFigureOut">
               <a:rPr lang="fr-FR" smtClean="0"/>
-              <a:t>12/12/2020</a:t>
+              <a:t>14/12/2020</a:t>
             </a:fld>
             <a:endParaRPr lang="fr-FR"/>
           </a:p>
@@ -1822,7 +1822,7 @@
           <a:p>
             <a:fld id="{E03E6CC4-A53F-6C4A-843B-012C7F076F51}" type="datetimeFigureOut">
               <a:rPr lang="fr-FR" smtClean="0"/>
-              <a:t>12/12/2020</a:t>
+              <a:t>14/12/2020</a:t>
             </a:fld>
             <a:endParaRPr lang="fr-FR"/>
           </a:p>
@@ -1963,7 +1963,7 @@
           <a:p>
             <a:fld id="{E03E6CC4-A53F-6C4A-843B-012C7F076F51}" type="datetimeFigureOut">
               <a:rPr lang="fr-FR" smtClean="0"/>
-              <a:t>12/12/2020</a:t>
+              <a:t>14/12/2020</a:t>
             </a:fld>
             <a:endParaRPr lang="fr-FR"/>
           </a:p>
@@ -2076,7 +2076,7 @@
           <a:p>
             <a:fld id="{E03E6CC4-A53F-6C4A-843B-012C7F076F51}" type="datetimeFigureOut">
               <a:rPr lang="fr-FR" smtClean="0"/>
-              <a:t>12/12/2020</a:t>
+              <a:t>14/12/2020</a:t>
             </a:fld>
             <a:endParaRPr lang="fr-FR"/>
           </a:p>
@@ -2387,7 +2387,7 @@
           <a:p>
             <a:fld id="{E03E6CC4-A53F-6C4A-843B-012C7F076F51}" type="datetimeFigureOut">
               <a:rPr lang="fr-FR" smtClean="0"/>
-              <a:t>12/12/2020</a:t>
+              <a:t>14/12/2020</a:t>
             </a:fld>
             <a:endParaRPr lang="fr-FR"/>
           </a:p>
@@ -2675,7 +2675,7 @@
           <a:p>
             <a:fld id="{E03E6CC4-A53F-6C4A-843B-012C7F076F51}" type="datetimeFigureOut">
               <a:rPr lang="fr-FR" smtClean="0"/>
-              <a:t>12/12/2020</a:t>
+              <a:t>14/12/2020</a:t>
             </a:fld>
             <a:endParaRPr lang="fr-FR"/>
           </a:p>
@@ -2916,7 +2916,7 @@
           <a:p>
             <a:fld id="{E03E6CC4-A53F-6C4A-843B-012C7F076F51}" type="datetimeFigureOut">
               <a:rPr lang="fr-FR" smtClean="0"/>
-              <a:t>12/12/2020</a:t>
+              <a:t>14/12/2020</a:t>
             </a:fld>
             <a:endParaRPr lang="fr-FR"/>
           </a:p>
@@ -6425,7 +6425,7 @@
                 <a:latin typeface="Arial" panose="020B0604020202020204" pitchFamily="34" charset="0"/>
                 <a:cs typeface="Arial" panose="020B0604020202020204" pitchFamily="34" charset="0"/>
               </a:rPr>
-              <a:t>nc_same_ovp_lncRNA</a:t>
+              <a:t>nc_same_ovp-lncRNA</a:t>
             </a:r>
             <a:r>
               <a:rPr lang="fr-FR" sz="1400" i="1" dirty="0">
@@ -6477,7 +6477,7 @@
                 <a:latin typeface="Arial" panose="020B0604020202020204" pitchFamily="34" charset="0"/>
                 <a:cs typeface="Arial" panose="020B0604020202020204" pitchFamily="34" charset="0"/>
               </a:rPr>
-              <a:t>nc_same_ovp_tRNA</a:t>
+              <a:t>nc_same_ovp-tRNA</a:t>
             </a:r>
             <a:r>
               <a:rPr lang="fr-FR" sz="1400" i="1" dirty="0">
@@ -6796,7 +6796,7 @@
         <p:spPr>
           <a:xfrm>
             <a:off x="2745528" y="2282375"/>
-            <a:ext cx="2473754" cy="307777"/>
+            <a:ext cx="2433680" cy="307777"/>
           </a:xfrm>
           <a:prstGeom prst="rect">
             <a:avLst/>
@@ -6821,14 +6821,14 @@
                 <a:latin typeface="Arial" panose="020B0604020202020204" pitchFamily="34" charset="0"/>
                 <a:cs typeface="Arial" panose="020B0604020202020204" pitchFamily="34" charset="0"/>
               </a:rPr>
-              <a:t>nc_same_ovp_CDS</a:t>
+              <a:t>nc_same_ovp</a:t>
             </a:r>
             <a:r>
               <a:rPr lang="fr-FR" sz="1400" i="1" dirty="0">
                 <a:latin typeface="Arial" panose="020B0604020202020204" pitchFamily="34" charset="0"/>
                 <a:cs typeface="Arial" panose="020B0604020202020204" pitchFamily="34" charset="0"/>
               </a:rPr>
-              <a:t> (3)</a:t>
+              <a:t>-CDS (3)</a:t>
             </a:r>
           </a:p>
         </p:txBody>
@@ -6895,7 +6895,7 @@
         <p:spPr>
           <a:xfrm>
             <a:off x="3003217" y="4679787"/>
-            <a:ext cx="2334293" cy="307777"/>
+            <a:ext cx="2294218" cy="307777"/>
           </a:xfrm>
           <a:prstGeom prst="rect">
             <a:avLst/>
@@ -6920,14 +6920,14 @@
                 <a:latin typeface="Arial" panose="020B0604020202020204" pitchFamily="34" charset="0"/>
                 <a:cs typeface="Arial" panose="020B0604020202020204" pitchFamily="34" charset="0"/>
               </a:rPr>
-              <a:t>nc_opp_ovp_CDS</a:t>
+              <a:t>nc_opp_ovp</a:t>
             </a:r>
             <a:r>
               <a:rPr lang="fr-FR" sz="1400" i="1" dirty="0">
                 <a:latin typeface="Arial" panose="020B0604020202020204" pitchFamily="34" charset="0"/>
                 <a:cs typeface="Arial" panose="020B0604020202020204" pitchFamily="34" charset="0"/>
               </a:rPr>
-              <a:t> (4)</a:t>
+              <a:t>-CDS (4)</a:t>
             </a:r>
           </a:p>
         </p:txBody>
@@ -6994,7 +6994,7 @@
         <p:spPr>
           <a:xfrm>
             <a:off x="7506679" y="2309870"/>
-            <a:ext cx="2334293" cy="307777"/>
+            <a:ext cx="2294218" cy="307777"/>
           </a:xfrm>
           <a:prstGeom prst="rect">
             <a:avLst/>
@@ -7019,14 +7019,14 @@
                 <a:latin typeface="Arial" panose="020B0604020202020204" pitchFamily="34" charset="0"/>
                 <a:cs typeface="Arial" panose="020B0604020202020204" pitchFamily="34" charset="0"/>
               </a:rPr>
-              <a:t>nc_opp_ovp_CDS</a:t>
+              <a:t>nc_opp_ovp</a:t>
             </a:r>
             <a:r>
               <a:rPr lang="fr-FR" sz="1400" i="1" dirty="0">
                 <a:latin typeface="Arial" panose="020B0604020202020204" pitchFamily="34" charset="0"/>
                 <a:cs typeface="Arial" panose="020B0604020202020204" pitchFamily="34" charset="0"/>
               </a:rPr>
-              <a:t> (4)</a:t>
+              <a:t>-CDS (4)</a:t>
             </a:r>
           </a:p>
         </p:txBody>
@@ -9383,7 +9383,7 @@
                 <a:latin typeface="Arial" panose="020B0604020202020204" pitchFamily="34" charset="0"/>
                 <a:cs typeface="Arial" panose="020B0604020202020204" pitchFamily="34" charset="0"/>
               </a:rPr>
-              <a:t>nc_same_ovp_mRNA</a:t>
+              <a:t>nc_same_ovp-mRNA</a:t>
             </a:r>
             <a:r>
               <a:rPr lang="fr-FR" b="1" dirty="0">
@@ -9435,7 +9435,7 @@
                 <a:latin typeface="Arial" panose="020B0604020202020204" pitchFamily="34" charset="0"/>
                 <a:cs typeface="Arial" panose="020B0604020202020204" pitchFamily="34" charset="0"/>
               </a:rPr>
-              <a:t>nc_same_ovp_mRNA</a:t>
+              <a:t>nc_same_ovp-mRNA</a:t>
             </a:r>
             <a:r>
               <a:rPr lang="fr-FR" b="1" dirty="0">

</xml_diff>